<commit_message>
Modified project report and designed presentation slides for Guided Capstone
</commit_message>
<xml_diff>
--- a/Guided_Capstone_Report_and_Presentation/Big_Mountain_Ski_Resort_Presentation.pptx
+++ b/Guided_Capstone_Report_and_Presentation/Big_Mountain_Ski_Resort_Presentation.pptx
@@ -5,15 +5,17 @@
     <p:sldMasterId id="2147483774" r:id="rId1"/>
   </p:sldMasterIdLst>
   <p:notesMasterIdLst>
-    <p:notesMasterId r:id="rId8"/>
+    <p:notesMasterId r:id="rId10"/>
   </p:notesMasterIdLst>
   <p:sldIdLst>
     <p:sldId id="256" r:id="rId2"/>
     <p:sldId id="271" r:id="rId3"/>
     <p:sldId id="257" r:id="rId4"/>
     <p:sldId id="274" r:id="rId5"/>
-    <p:sldId id="270" r:id="rId6"/>
-    <p:sldId id="273" r:id="rId7"/>
+    <p:sldId id="275" r:id="rId6"/>
+    <p:sldId id="276" r:id="rId7"/>
+    <p:sldId id="270" r:id="rId8"/>
+    <p:sldId id="273" r:id="rId9"/>
   </p:sldIdLst>
   <p:sldSz cx="9144000" cy="6858000" type="screen4x3"/>
   <p:notesSz cx="6858000" cy="9144000"/>
@@ -4192,7 +4194,7 @@
         </p:nvSpPr>
         <p:spPr>
           <a:xfrm>
-            <a:off x="-89133" y="1619412"/>
+            <a:off x="-89133" y="2122332"/>
             <a:ext cx="9322266" cy="2000548"/>
           </a:xfrm>
           <a:prstGeom prst="rect">
@@ -4342,8 +4344,8 @@
         </p:nvSpPr>
         <p:spPr>
           <a:xfrm>
-            <a:off x="470472" y="4401235"/>
-            <a:ext cx="8263160" cy="1015663"/>
+            <a:off x="2611763" y="4401235"/>
+            <a:ext cx="3980577" cy="461665"/>
           </a:xfrm>
           <a:prstGeom prst="rect">
             <a:avLst/>
@@ -4354,36 +4356,6 @@
             <a:spAutoFit/>
           </a:bodyPr>
           <a:lstStyle/>
-          <a:p>
-            <a:pPr algn="ctr"/>
-            <a:r>
-              <a:rPr lang="en-US" baseline="30000" dirty="0">
-                <a:latin typeface="Arial" panose="020B0604020202020204" pitchFamily="34" charset="0"/>
-                <a:cs typeface="Arial" panose="020B0604020202020204" pitchFamily="34" charset="0"/>
-              </a:rPr>
-              <a:t>Resources Provided by London Datastore: a free, open-source data-sharing portal for London-oriented datasets</a:t>
-            </a:r>
-          </a:p>
-          <a:p>
-            <a:pPr algn="ctr"/>
-            <a:r>
-              <a:rPr lang="en-US" baseline="30000" dirty="0">
-                <a:latin typeface="Arial" panose="020B0604020202020204" pitchFamily="34" charset="0"/>
-                <a:cs typeface="Arial" panose="020B0604020202020204" pitchFamily="34" charset="0"/>
-              </a:rPr>
-              <a:t>Code to assist provided by Tier 1 Project Platform and Stack Overflow and statology.org and associated documentation</a:t>
-            </a:r>
-          </a:p>
-          <a:p>
-            <a:pPr algn="ctr"/>
-            <a:r>
-              <a:rPr lang="en-US" baseline="30000" dirty="0">
-                <a:latin typeface="Arial" panose="020B0604020202020204" pitchFamily="34" charset="0"/>
-                <a:cs typeface="Arial" panose="020B0604020202020204" pitchFamily="34" charset="0"/>
-              </a:rPr>
-              <a:t>List of London Boroughs provided by https://www.londononline.co.uk/boroughs/enfield/</a:t>
-            </a:r>
-          </a:p>
           <a:p>
             <a:pPr algn="ctr"/>
             <a:r>
@@ -4528,7 +4500,7 @@
         <p:spPr>
           <a:xfrm>
             <a:off x="822959" y="1894960"/>
-            <a:ext cx="6634854" cy="3367076"/>
+            <a:ext cx="6634854" cy="3970318"/>
           </a:xfrm>
           <a:prstGeom prst="rect">
             <a:avLst/>
@@ -4571,14 +4543,33 @@
               <a:buChar char="–"/>
             </a:pPr>
             <a:r>
-              <a:rPr lang="en-US" sz="2000" kern="0" dirty="0">
+              <a:rPr lang="en-US" sz="1600" b="0" i="0" u="none" strike="noStrike" dirty="0">
+                <a:solidFill>
+                  <a:srgbClr val="000000"/>
+                </a:solidFill>
+                <a:effectLst/>
+                <a:latin typeface="Arial" panose="020B0604020202020204" pitchFamily="34" charset="0"/>
+              </a:rPr>
+              <a:t>Big Mountain Resort is a ski resort located in Montana that has access to 105 trails and about 350,000 people ski or snowboard at the resort. However, the company has installed another chair lift increasing their operating costs to $1,540,000 this season. Is ther</a:t>
+            </a:r>
+            <a:r>
+              <a:rPr lang="en-US" sz="1600" dirty="0">
+                <a:solidFill>
+                  <a:srgbClr val="000000"/>
+                </a:solidFill>
+                <a:latin typeface="Arial" panose="020B0604020202020204" pitchFamily="34" charset="0"/>
+              </a:rPr>
+              <a:t>e a more sufficient pricing strategy to help recoup the operational costs</a:t>
+            </a:r>
+            <a:r>
+              <a:rPr lang="en-US" sz="1600" kern="0" dirty="0">
                 <a:solidFill>
                   <a:srgbClr val="000000"/>
                 </a:solidFill>
                 <a:latin typeface="Arial"/>
                 <a:ea typeface="ＭＳ Ｐゴシック" pitchFamily="-110" charset="-128"/>
               </a:rPr>
-              <a:t>Which boroughs of London have seen the greatest increase in housing prices, on average, over the last two decades?</a:t>
+              <a:t>?</a:t>
             </a:r>
           </a:p>
           <a:p>
@@ -4601,12 +4592,36 @@
               <a:buChar char="•"/>
             </a:pPr>
             <a:r>
-              <a:rPr lang="en-US" sz="2400" dirty="0">
+              <a:rPr lang="en-US" sz="2000" dirty="0">
                 <a:latin typeface="Arial" panose="020B0604020202020204" pitchFamily="34" charset="0"/>
                 <a:cs typeface="Arial" panose="020B0604020202020204" pitchFamily="34" charset="0"/>
               </a:rPr>
-              <a:t>Objective: Determine the average price increase ratios for each London Borough from 2003 and 2023 for the London Datastore dataset.</a:t>
-            </a:r>
+              <a:t>Objective:</a:t>
+            </a:r>
+            <a:r>
+              <a:rPr lang="en-US" sz="2000" dirty="0">
+                <a:solidFill>
+                  <a:srgbClr val="000000"/>
+                </a:solidFill>
+                <a:latin typeface="Arial" panose="020B0604020202020204" pitchFamily="34" charset="0"/>
+                <a:cs typeface="Arial" panose="020B0604020202020204" pitchFamily="34" charset="0"/>
+              </a:rPr>
+              <a:t> R</a:t>
+            </a:r>
+            <a:r>
+              <a:rPr lang="en-US" sz="2000" b="0" i="0" u="none" strike="noStrike" dirty="0">
+                <a:solidFill>
+                  <a:srgbClr val="000000"/>
+                </a:solidFill>
+                <a:effectLst/>
+                <a:latin typeface="Arial" panose="020B0604020202020204" pitchFamily="34" charset="0"/>
+              </a:rPr>
+              <a:t>ecommend a business strategy for recouping the increased operational cost of $1.54MM for installing a new chair lift this season, while keeping the profit margins at 9.2% as well as provide insights on annual revenue for the season over the next year.</a:t>
+            </a:r>
+            <a:endParaRPr lang="en-US" sz="2000" dirty="0">
+              <a:latin typeface="Arial" panose="020B0604020202020204" pitchFamily="34" charset="0"/>
+              <a:cs typeface="Arial" panose="020B0604020202020204" pitchFamily="34" charset="0"/>
+            </a:endParaRPr>
           </a:p>
         </p:txBody>
       </p:sp>
@@ -4737,21 +4752,23 @@
           </a:ln>
         </p:spPr>
         <p:txBody>
-          <a:bodyPr/>
+          <a:bodyPr>
+            <a:normAutofit/>
+          </a:bodyPr>
           <a:lstStyle/>
           <a:p>
             <a:pPr algn="ctr"/>
             <a:r>
-              <a:rPr lang="en-US" sz="4000" kern="0" spc="0" dirty="0">
+              <a:rPr lang="en-US" sz="3500" kern="0" spc="0" dirty="0">
                 <a:solidFill>
                   <a:srgbClr val="000000"/>
                 </a:solidFill>
                 <a:latin typeface="Arial"/>
                 <a:ea typeface="ＭＳ Ｐゴシック" pitchFamily="-110" charset="-128"/>
               </a:rPr>
-              <a:t>Plot &amp; Observations</a:t>
-            </a:r>
-            <a:endParaRPr lang="en-US" dirty="0"/>
+              <a:t>Recommendation &amp; Key Findings</a:t>
+            </a:r>
+            <a:endParaRPr lang="en-US" sz="3500" dirty="0"/>
           </a:p>
         </p:txBody>
       </p:sp>
@@ -4820,210 +4837,283 @@
           </a:prstGeom>
         </p:spPr>
       </p:pic>
-      <p:sp>
-        <p:nvSpPr>
-          <p:cNvPr id="23" name="Rectangle 22">
+      <p:pic>
+        <p:nvPicPr>
+          <p:cNvPr id="1026" name="Picture 2">
             <a:extLst>
               <a:ext uri="{FF2B5EF4-FFF2-40B4-BE49-F238E27FC236}">
-                <a16:creationId xmlns:a16="http://schemas.microsoft.com/office/drawing/2014/main" id="{ABD1EACF-F448-0DC3-B6D6-3D430E8E5303}"/>
-              </a:ext>
-            </a:extLst>
-          </p:cNvPr>
-          <p:cNvSpPr/>
-          <p:nvPr/>
-        </p:nvSpPr>
-        <p:spPr>
-          <a:xfrm>
-            <a:off x="5116321" y="5906644"/>
-            <a:ext cx="3293042" cy="256673"/>
-          </a:xfrm>
-          <a:prstGeom prst="rect">
-            <a:avLst/>
-          </a:prstGeom>
-        </p:spPr>
-        <p:txBody>
-          <a:bodyPr wrap="square">
-            <a:spAutoFit/>
-          </a:bodyPr>
-          <a:lstStyle/>
-          <a:p>
-            <a:pPr>
-              <a:lnSpc>
-                <a:spcPct val="107000"/>
-              </a:lnSpc>
-            </a:pPr>
-            <a:r>
-              <a:rPr lang="en-US" sz="1050" b="1" dirty="0">
-                <a:latin typeface="Times New Roman" panose="02020603050405020304" pitchFamily="18" charset="0"/>
-                <a:ea typeface="Calibri" panose="020F0502020204030204" pitchFamily="34" charset="0"/>
-                <a:cs typeface="Times New Roman" panose="02020603050405020304" pitchFamily="18" charset="0"/>
-              </a:rPr>
-              <a:t>Data for analysis provided by </a:t>
-            </a:r>
-            <a:r>
-              <a:rPr lang="en-US" sz="1050" dirty="0">
-                <a:hlinkClick r:id="rId3"/>
-              </a:rPr>
-              <a:t>London Datastore</a:t>
-            </a:r>
-            <a:endParaRPr lang="en-US" sz="1050" dirty="0">
-              <a:latin typeface="Calibri" panose="020F0502020204030204" pitchFamily="34" charset="0"/>
-              <a:ea typeface="Calibri" panose="020F0502020204030204" pitchFamily="34" charset="0"/>
-              <a:cs typeface="Times New Roman" panose="02020603050405020304" pitchFamily="18" charset="0"/>
-            </a:endParaRPr>
-          </a:p>
-        </p:txBody>
-      </p:sp>
-      <p:pic>
-        <p:nvPicPr>
-          <p:cNvPr id="6" name="Picture 5">
-            <a:extLst>
-              <a:ext uri="{FF2B5EF4-FFF2-40B4-BE49-F238E27FC236}">
-                <a16:creationId xmlns:a16="http://schemas.microsoft.com/office/drawing/2014/main" id="{3098B956-472F-53C9-8DCB-D8522B32DE8D}"/>
+                <a16:creationId xmlns:a16="http://schemas.microsoft.com/office/drawing/2014/main" id="{BDA70C89-EB38-69C4-164D-03F07F7C6A81}"/>
               </a:ext>
             </a:extLst>
           </p:cNvPr>
           <p:cNvPicPr>
-            <a:picLocks noChangeAspect="1"/>
+            <a:picLocks noChangeAspect="1" noChangeArrowheads="1"/>
           </p:cNvPicPr>
           <p:nvPr/>
         </p:nvPicPr>
         <p:blipFill>
-          <a:blip r:embed="rId4"/>
+          <a:blip r:embed="rId3">
+            <a:extLst>
+              <a:ext uri="{28A0092B-C50C-407E-A947-70E740481C1C}">
+                <a14:useLocalDpi xmlns:a14="http://schemas.microsoft.com/office/drawing/2010/main" val="0"/>
+              </a:ext>
+            </a:extLst>
+          </a:blip>
+          <a:srcRect/>
           <a:stretch>
             <a:fillRect/>
           </a:stretch>
         </p:blipFill>
-        <p:spPr>
-          <a:xfrm>
-            <a:off x="292281" y="1888554"/>
-            <a:ext cx="4779418" cy="4353950"/>
+        <p:spPr bwMode="auto">
+          <a:xfrm>
+            <a:off x="4355800" y="1867126"/>
+            <a:ext cx="4218591" cy="3054137"/>
           </a:xfrm>
           <a:prstGeom prst="rect">
             <a:avLst/>
           </a:prstGeom>
+          <a:noFill/>
+          <a:extLst>
+            <a:ext uri="{909E8E84-426E-40DD-AFC4-6F175D3DCCD1}">
+              <a14:hiddenFill xmlns:a14="http://schemas.microsoft.com/office/drawing/2010/main">
+                <a:solidFill>
+                  <a:srgbClr val="FFFFFF"/>
+                </a:solidFill>
+              </a14:hiddenFill>
+            </a:ext>
+          </a:extLst>
         </p:spPr>
       </p:pic>
+      <p:sp>
+        <p:nvSpPr>
+          <p:cNvPr id="5" name="TextBox 4">
+            <a:extLst>
+              <a:ext uri="{FF2B5EF4-FFF2-40B4-BE49-F238E27FC236}">
+                <a16:creationId xmlns:a16="http://schemas.microsoft.com/office/drawing/2014/main" id="{E9B86E43-1C55-EDAA-C1C0-F98009EC1062}"/>
+              </a:ext>
+            </a:extLst>
+          </p:cNvPr>
+          <p:cNvSpPr txBox="1"/>
+          <p:nvPr/>
+        </p:nvSpPr>
+        <p:spPr>
+          <a:xfrm>
+            <a:off x="4922728" y="5055484"/>
+            <a:ext cx="4572000" cy="215444"/>
+          </a:xfrm>
+          <a:prstGeom prst="rect">
+            <a:avLst/>
+          </a:prstGeom>
+          <a:noFill/>
+        </p:spPr>
+        <p:txBody>
+          <a:bodyPr wrap="square">
+            <a:spAutoFit/>
+          </a:bodyPr>
+          <a:lstStyle/>
+          <a:p>
+            <a:r>
+              <a:rPr lang="en-US" sz="800" b="0" i="0" u="none" strike="noStrike" dirty="0">
+                <a:solidFill>
+                  <a:srgbClr val="000000"/>
+                </a:solidFill>
+                <a:effectLst/>
+                <a:latin typeface="Arial" panose="020B0604020202020204" pitchFamily="34" charset="0"/>
+              </a:rPr>
+              <a:t>*Key features identified from random forest regressor model</a:t>
+            </a:r>
+            <a:endParaRPr lang="en-US" sz="800" dirty="0"/>
+          </a:p>
+        </p:txBody>
+      </p:sp>
+      <p:sp>
+        <p:nvSpPr>
+          <p:cNvPr id="9" name="TextBox 8">
+            <a:extLst>
+              <a:ext uri="{FF2B5EF4-FFF2-40B4-BE49-F238E27FC236}">
+                <a16:creationId xmlns:a16="http://schemas.microsoft.com/office/drawing/2014/main" id="{DC5AC42F-5D01-3D29-95CE-0139C25FA92F}"/>
+              </a:ext>
+            </a:extLst>
+          </p:cNvPr>
+          <p:cNvSpPr txBox="1"/>
+          <p:nvPr/>
+        </p:nvSpPr>
+        <p:spPr>
+          <a:xfrm>
+            <a:off x="464740" y="5399481"/>
+            <a:ext cx="8214519" cy="954107"/>
+          </a:xfrm>
+          <a:prstGeom prst="rect">
+            <a:avLst/>
+          </a:prstGeom>
+          <a:noFill/>
+        </p:spPr>
+        <p:txBody>
+          <a:bodyPr wrap="square">
+            <a:spAutoFit/>
+          </a:bodyPr>
+          <a:lstStyle/>
+          <a:p>
+            <a:r>
+              <a:rPr lang="en-US" sz="1400" b="1" i="0" u="none" strike="noStrike" dirty="0">
+                <a:solidFill>
+                  <a:srgbClr val="000000"/>
+                </a:solidFill>
+                <a:effectLst/>
+                <a:latin typeface="Arial" panose="020B0604020202020204" pitchFamily="34" charset="0"/>
+              </a:rPr>
+              <a:t>Recommended Pricing Strategy</a:t>
+            </a:r>
+            <a:r>
+              <a:rPr lang="en-US" sz="1400" b="0" i="0" u="none" strike="noStrike" dirty="0">
+                <a:solidFill>
+                  <a:srgbClr val="000000"/>
+                </a:solidFill>
+                <a:effectLst/>
+                <a:latin typeface="Arial" panose="020B0604020202020204" pitchFamily="34" charset="0"/>
+              </a:rPr>
+              <a:t>: Big Mountain Ski Resort in adding another chair lift for their resort </a:t>
+            </a:r>
+            <a:r>
+              <a:rPr lang="en-US" sz="1400" dirty="0">
+                <a:solidFill>
+                  <a:srgbClr val="000000"/>
+                </a:solidFill>
+                <a:latin typeface="Arial" panose="020B0604020202020204" pitchFamily="34" charset="0"/>
+              </a:rPr>
+              <a:t>should also</a:t>
+            </a:r>
+            <a:r>
+              <a:rPr lang="en-US" sz="1400" b="0" i="0" u="none" strike="noStrike" dirty="0">
+                <a:solidFill>
+                  <a:srgbClr val="000000"/>
+                </a:solidFill>
+                <a:effectLst/>
+                <a:latin typeface="Arial" panose="020B0604020202020204" pitchFamily="34" charset="0"/>
+              </a:rPr>
+              <a:t> increase their price to $90.90 per ticket</a:t>
+            </a:r>
+            <a:r>
+              <a:rPr lang="en-US" sz="1400" dirty="0">
+                <a:solidFill>
+                  <a:srgbClr val="000000"/>
+                </a:solidFill>
+                <a:latin typeface="Arial" panose="020B0604020202020204" pitchFamily="34" charset="0"/>
+              </a:rPr>
+              <a:t> while also adding another run and </a:t>
+            </a:r>
+            <a:r>
+              <a:rPr lang="en-US" sz="1400" b="0" i="0" u="none" strike="noStrike" dirty="0">
+                <a:solidFill>
+                  <a:srgbClr val="000000"/>
+                </a:solidFill>
+                <a:effectLst/>
+                <a:latin typeface="Arial" panose="020B0604020202020204" pitchFamily="34" charset="0"/>
+              </a:rPr>
+              <a:t>increasing the vertical drop distance by 150 feet as well as increasing the snow making machine coverage by 2 acres.</a:t>
+            </a:r>
+            <a:endParaRPr lang="en-US" sz="1400" dirty="0"/>
+          </a:p>
+        </p:txBody>
+      </p:sp>
       <p:pic>
         <p:nvPicPr>
-          <p:cNvPr id="8" name="Picture 7">
+          <p:cNvPr id="1028" name="Picture 4">
             <a:extLst>
               <a:ext uri="{FF2B5EF4-FFF2-40B4-BE49-F238E27FC236}">
-                <a16:creationId xmlns:a16="http://schemas.microsoft.com/office/drawing/2014/main" id="{E3C53B37-3C35-D676-35B8-615EFAC299F9}"/>
+                <a16:creationId xmlns:a16="http://schemas.microsoft.com/office/drawing/2014/main" id="{4C299464-18B3-F4DA-9FD9-40975D3F2DD3}"/>
               </a:ext>
             </a:extLst>
           </p:cNvPr>
           <p:cNvPicPr>
-            <a:picLocks noChangeAspect="1"/>
+            <a:picLocks noChangeAspect="1" noChangeArrowheads="1"/>
           </p:cNvPicPr>
           <p:nvPr/>
         </p:nvPicPr>
         <p:blipFill>
-          <a:blip r:embed="rId5"/>
+          <a:blip r:embed="rId4">
+            <a:extLst>
+              <a:ext uri="{28A0092B-C50C-407E-A947-70E740481C1C}">
+                <a14:useLocalDpi xmlns:a14="http://schemas.microsoft.com/office/drawing/2010/main" val="0"/>
+              </a:ext>
+            </a:extLst>
+          </a:blip>
+          <a:srcRect/>
           <a:stretch>
             <a:fillRect/>
           </a:stretch>
         </p:blipFill>
-        <p:spPr>
-          <a:xfrm>
-            <a:off x="4856767" y="1858225"/>
-            <a:ext cx="3293042" cy="337748"/>
+        <p:spPr bwMode="auto">
+          <a:xfrm>
+            <a:off x="216200" y="1830080"/>
+            <a:ext cx="3577209" cy="3277108"/>
           </a:xfrm>
           <a:prstGeom prst="rect">
             <a:avLst/>
           </a:prstGeom>
+          <a:noFill/>
+          <a:extLst>
+            <a:ext uri="{909E8E84-426E-40DD-AFC4-6F175D3DCCD1}">
+              <a14:hiddenFill xmlns:a14="http://schemas.microsoft.com/office/drawing/2010/main">
+                <a:solidFill>
+                  <a:srgbClr val="FFFFFF"/>
+                </a:solidFill>
+              </a14:hiddenFill>
+            </a:ext>
+          </a:extLst>
         </p:spPr>
       </p:pic>
-      <p:pic>
-        <p:nvPicPr>
-          <p:cNvPr id="10" name="Picture 9">
+      <p:sp>
+        <p:nvSpPr>
+          <p:cNvPr id="11" name="TextBox 10">
             <a:extLst>
               <a:ext uri="{FF2B5EF4-FFF2-40B4-BE49-F238E27FC236}">
-                <a16:creationId xmlns:a16="http://schemas.microsoft.com/office/drawing/2014/main" id="{6480F6FC-5D77-92F7-B2CE-006C9295891E}"/>
+                <a16:creationId xmlns:a16="http://schemas.microsoft.com/office/drawing/2014/main" id="{CF3537CE-0010-7082-F956-EC0E42C26615}"/>
               </a:ext>
             </a:extLst>
           </p:cNvPr>
-          <p:cNvPicPr>
-            <a:picLocks noChangeAspect="1"/>
-          </p:cNvPicPr>
+          <p:cNvSpPr txBox="1"/>
           <p:nvPr/>
-        </p:nvPicPr>
-        <p:blipFill>
-          <a:blip r:embed="rId6"/>
-          <a:stretch>
-            <a:fillRect/>
-          </a:stretch>
-        </p:blipFill>
-        <p:spPr>
-          <a:xfrm>
-            <a:off x="5070235" y="2187896"/>
-            <a:ext cx="2038635" cy="1638529"/>
+        </p:nvSpPr>
+        <p:spPr>
+          <a:xfrm>
+            <a:off x="350728" y="5052564"/>
+            <a:ext cx="4572000" cy="215444"/>
           </a:xfrm>
           <a:prstGeom prst="rect">
             <a:avLst/>
           </a:prstGeom>
-        </p:spPr>
-      </p:pic>
-      <p:pic>
-        <p:nvPicPr>
-          <p:cNvPr id="13" name="Picture 12">
-            <a:extLst>
-              <a:ext uri="{FF2B5EF4-FFF2-40B4-BE49-F238E27FC236}">
-                <a16:creationId xmlns:a16="http://schemas.microsoft.com/office/drawing/2014/main" id="{9FCBA119-CF8F-9E35-4D5D-A86BEEF744EA}"/>
-              </a:ext>
-            </a:extLst>
-          </p:cNvPr>
-          <p:cNvPicPr>
-            <a:picLocks noChangeAspect="1"/>
-          </p:cNvPicPr>
-          <p:nvPr/>
-        </p:nvPicPr>
-        <p:blipFill>
-          <a:blip r:embed="rId7"/>
-          <a:stretch>
-            <a:fillRect/>
-          </a:stretch>
-        </p:blipFill>
-        <p:spPr>
-          <a:xfrm>
-            <a:off x="4856767" y="3961492"/>
-            <a:ext cx="3445364" cy="289738"/>
-          </a:xfrm>
-          <a:prstGeom prst="rect">
-            <a:avLst/>
-          </a:prstGeom>
-        </p:spPr>
-      </p:pic>
-      <p:pic>
-        <p:nvPicPr>
-          <p:cNvPr id="15" name="Picture 14">
-            <a:extLst>
-              <a:ext uri="{FF2B5EF4-FFF2-40B4-BE49-F238E27FC236}">
-                <a16:creationId xmlns:a16="http://schemas.microsoft.com/office/drawing/2014/main" id="{B308E5EF-B31E-EA39-F318-53387C553BF5}"/>
-              </a:ext>
-            </a:extLst>
-          </p:cNvPr>
-          <p:cNvPicPr>
-            <a:picLocks noChangeAspect="1"/>
-          </p:cNvPicPr>
-          <p:nvPr/>
-        </p:nvPicPr>
-        <p:blipFill>
-          <a:blip r:embed="rId8"/>
-          <a:stretch>
-            <a:fillRect/>
-          </a:stretch>
-        </p:blipFill>
-        <p:spPr>
-          <a:xfrm>
-            <a:off x="4997751" y="4271456"/>
-            <a:ext cx="2183602" cy="1517121"/>
-          </a:xfrm>
-          <a:prstGeom prst="rect">
-            <a:avLst/>
-          </a:prstGeom>
-        </p:spPr>
-      </p:pic>
+          <a:noFill/>
+        </p:spPr>
+        <p:txBody>
+          <a:bodyPr wrap="square">
+            <a:spAutoFit/>
+          </a:bodyPr>
+          <a:lstStyle/>
+          <a:p>
+            <a:r>
+              <a:rPr lang="en-US" sz="800" b="0" i="0" u="none" strike="noStrike" dirty="0">
+                <a:solidFill>
+                  <a:srgbClr val="000000"/>
+                </a:solidFill>
+                <a:effectLst/>
+                <a:latin typeface="Arial" panose="020B0604020202020204" pitchFamily="34" charset="0"/>
+              </a:rPr>
+              <a:t>*</a:t>
+            </a:r>
+            <a:r>
+              <a:rPr lang="en-US" sz="800" dirty="0">
+                <a:solidFill>
+                  <a:srgbClr val="000000"/>
+                </a:solidFill>
+                <a:latin typeface="Arial" panose="020B0604020202020204" pitchFamily="34" charset="0"/>
+              </a:rPr>
+              <a:t>Correlation Heatmap showcasing correlations among values in dataset</a:t>
+            </a:r>
+            <a:endParaRPr lang="en-US" sz="800" dirty="0"/>
+          </a:p>
+        </p:txBody>
+      </p:sp>
     </p:spTree>
     <p:extLst>
       <p:ext uri="{BB962C8B-B14F-4D97-AF65-F5344CB8AC3E}">
@@ -5085,16 +5175,6 @@
           <a:p>
             <a:pPr algn="ctr"/>
             <a:r>
-              <a:rPr lang="en-US" sz="4000" kern="0" spc="0" dirty="0" err="1">
-                <a:solidFill>
-                  <a:srgbClr val="000000"/>
-                </a:solidFill>
-                <a:latin typeface="Arial"/>
-                <a:ea typeface="ＭＳ Ｐゴシック" pitchFamily="-110" charset="-128"/>
-              </a:rPr>
-              <a:t>Create_Price_Ratio</a:t>
-            </a:r>
-            <a:r>
               <a:rPr lang="en-US" sz="4000" kern="0" spc="0" dirty="0">
                 <a:solidFill>
                   <a:srgbClr val="000000"/>
@@ -5102,7 +5182,7 @@
                 <a:latin typeface="Arial"/>
                 <a:ea typeface="ＭＳ Ｐゴシック" pitchFamily="-110" charset="-128"/>
               </a:rPr>
-              <a:t>()</a:t>
+              <a:t>Establishing a Predictive Model</a:t>
             </a:r>
             <a:endParaRPr lang="en-US" dirty="0"/>
           </a:p>
@@ -5173,36 +5253,6 @@
           </a:prstGeom>
         </p:spPr>
       </p:pic>
-      <p:pic>
-        <p:nvPicPr>
-          <p:cNvPr id="5" name="Picture 4">
-            <a:extLst>
-              <a:ext uri="{FF2B5EF4-FFF2-40B4-BE49-F238E27FC236}">
-                <a16:creationId xmlns:a16="http://schemas.microsoft.com/office/drawing/2014/main" id="{B966693A-FF36-968E-1332-468F27F4D895}"/>
-              </a:ext>
-            </a:extLst>
-          </p:cNvPr>
-          <p:cNvPicPr>
-            <a:picLocks noChangeAspect="1"/>
-          </p:cNvPicPr>
-          <p:nvPr/>
-        </p:nvPicPr>
-        <p:blipFill>
-          <a:blip r:embed="rId3"/>
-          <a:stretch>
-            <a:fillRect/>
-          </a:stretch>
-        </p:blipFill>
-        <p:spPr>
-          <a:xfrm>
-            <a:off x="848817" y="2129198"/>
-            <a:ext cx="7068536" cy="990738"/>
-          </a:xfrm>
-          <a:prstGeom prst="rect">
-            <a:avLst/>
-          </a:prstGeom>
-        </p:spPr>
-      </p:pic>
       <p:sp>
         <p:nvSpPr>
           <p:cNvPr id="7" name="Rectangle 6">
@@ -5217,8 +5267,8 @@
         </p:nvSpPr>
         <p:spPr>
           <a:xfrm>
-            <a:off x="681694" y="3119936"/>
-            <a:ext cx="8163955" cy="2246769"/>
+            <a:off x="736558" y="1678204"/>
+            <a:ext cx="8163955" cy="2862322"/>
           </a:xfrm>
           <a:prstGeom prst="rect">
             <a:avLst/>
@@ -5245,7 +5295,7 @@
                 <a:latin typeface="Arial" panose="020B0604020202020204" pitchFamily="34" charset="0"/>
                 <a:cs typeface="Arial" panose="020B0604020202020204" pitchFamily="34" charset="0"/>
               </a:rPr>
-              <a:t>Function first filters dataset for specific borough name</a:t>
+              <a:t>Mean Absolute Error used as key metric to compare different predictive models.</a:t>
             </a:r>
           </a:p>
           <a:p>
@@ -5258,7 +5308,21 @@
                 <a:latin typeface="Arial" panose="020B0604020202020204" pitchFamily="34" charset="0"/>
                 <a:cs typeface="Arial" panose="020B0604020202020204" pitchFamily="34" charset="0"/>
               </a:rPr>
-              <a:t>Function then further filters to retrieve the ‘Average Prices’ column for the year specified</a:t>
+              <a:t>Mean of </a:t>
+            </a:r>
+            <a:r>
+              <a:rPr lang="en-US" sz="2000" dirty="0" err="1">
+                <a:latin typeface="Arial" panose="020B0604020202020204" pitchFamily="34" charset="0"/>
+                <a:cs typeface="Arial" panose="020B0604020202020204" pitchFamily="34" charset="0"/>
+              </a:rPr>
+              <a:t>AdultWeekend</a:t>
+            </a:r>
+            <a:r>
+              <a:rPr lang="en-US" sz="2000" dirty="0">
+                <a:latin typeface="Arial" panose="020B0604020202020204" pitchFamily="34" charset="0"/>
+                <a:cs typeface="Arial" panose="020B0604020202020204" pitchFamily="34" charset="0"/>
+              </a:rPr>
+              <a:t> price column lead to predictions being off by $19 from actual. </a:t>
             </a:r>
           </a:p>
           <a:p>
@@ -5271,8 +5335,183 @@
                 <a:latin typeface="Arial" panose="020B0604020202020204" pitchFamily="34" charset="0"/>
                 <a:cs typeface="Arial" panose="020B0604020202020204" pitchFamily="34" charset="0"/>
               </a:rPr>
-              <a:t>Function then performs a ratio calculation dividing the mean of the starting year ‘Average Price’ column with the mean of the ending year ‘Average Price’ column </a:t>
-            </a:r>
+              <a:t>Linear Regression model had an increased accuracy of prediction by being off by $11.80. </a:t>
+            </a:r>
+          </a:p>
+          <a:p>
+            <a:pPr marL="285750" indent="-285750">
+              <a:buFont typeface="Arial" panose="020B0604020202020204" pitchFamily="34" charset="0"/>
+              <a:buChar char="•"/>
+            </a:pPr>
+            <a:r>
+              <a:rPr lang="en-US" sz="2000" dirty="0">
+                <a:latin typeface="Arial" panose="020B0604020202020204" pitchFamily="34" charset="0"/>
+                <a:cs typeface="Arial" panose="020B0604020202020204" pitchFamily="34" charset="0"/>
+              </a:rPr>
+              <a:t>Random Forest Regressor model lead to greater accuracy of being off about $9.50 from actual. </a:t>
+            </a:r>
+          </a:p>
+        </p:txBody>
+      </p:sp>
+      <p:pic>
+        <p:nvPicPr>
+          <p:cNvPr id="8" name="image2.png">
+            <a:extLst>
+              <a:ext uri="{FF2B5EF4-FFF2-40B4-BE49-F238E27FC236}">
+                <a16:creationId xmlns:a16="http://schemas.microsoft.com/office/drawing/2014/main" id="{13BBDEC1-14A1-8B27-79CF-BB1E7AF5D3D0}"/>
+              </a:ext>
+            </a:extLst>
+          </p:cNvPr>
+          <p:cNvPicPr/>
+          <p:nvPr/>
+        </p:nvPicPr>
+        <p:blipFill>
+          <a:blip r:embed="rId3"/>
+          <a:srcRect/>
+          <a:stretch>
+            <a:fillRect/>
+          </a:stretch>
+        </p:blipFill>
+        <p:spPr>
+          <a:xfrm>
+            <a:off x="822960" y="4605821"/>
+            <a:ext cx="1158240" cy="1309370"/>
+          </a:xfrm>
+          <a:prstGeom prst="rect">
+            <a:avLst/>
+          </a:prstGeom>
+          <a:ln/>
+        </p:spPr>
+      </p:pic>
+      <p:pic>
+        <p:nvPicPr>
+          <p:cNvPr id="9" name="image1.png">
+            <a:extLst>
+              <a:ext uri="{FF2B5EF4-FFF2-40B4-BE49-F238E27FC236}">
+                <a16:creationId xmlns:a16="http://schemas.microsoft.com/office/drawing/2014/main" id="{A82FC583-030E-9BEB-E687-63B956A02D6C}"/>
+              </a:ext>
+            </a:extLst>
+          </p:cNvPr>
+          <p:cNvPicPr/>
+          <p:nvPr/>
+        </p:nvPicPr>
+        <p:blipFill>
+          <a:blip r:embed="rId4"/>
+          <a:srcRect/>
+          <a:stretch>
+            <a:fillRect/>
+          </a:stretch>
+        </p:blipFill>
+        <p:spPr>
+          <a:xfrm>
+            <a:off x="2132125" y="4664241"/>
+            <a:ext cx="1484630" cy="1192530"/>
+          </a:xfrm>
+          <a:prstGeom prst="rect">
+            <a:avLst/>
+          </a:prstGeom>
+          <a:ln/>
+        </p:spPr>
+      </p:pic>
+      <p:sp>
+        <p:nvSpPr>
+          <p:cNvPr id="14" name="TextBox 13">
+            <a:extLst>
+              <a:ext uri="{FF2B5EF4-FFF2-40B4-BE49-F238E27FC236}">
+                <a16:creationId xmlns:a16="http://schemas.microsoft.com/office/drawing/2014/main" id="{AA9A0C59-3172-C45A-8FBD-51A71713A633}"/>
+              </a:ext>
+            </a:extLst>
+          </p:cNvPr>
+          <p:cNvSpPr txBox="1"/>
+          <p:nvPr/>
+        </p:nvSpPr>
+        <p:spPr>
+          <a:xfrm>
+            <a:off x="709598" y="5980486"/>
+            <a:ext cx="4896612" cy="221856"/>
+          </a:xfrm>
+          <a:prstGeom prst="rect">
+            <a:avLst/>
+          </a:prstGeom>
+          <a:noFill/>
+        </p:spPr>
+        <p:txBody>
+          <a:bodyPr wrap="square">
+            <a:spAutoFit/>
+          </a:bodyPr>
+          <a:lstStyle/>
+          <a:p>
+            <a:pPr marL="0" marR="0">
+              <a:lnSpc>
+                <a:spcPct val="115000"/>
+              </a:lnSpc>
+              <a:spcBef>
+                <a:spcPts val="1200"/>
+              </a:spcBef>
+              <a:spcAft>
+                <a:spcPts val="1200"/>
+              </a:spcAft>
+            </a:pPr>
+            <a:r>
+              <a:rPr lang="en-US" sz="800" dirty="0">
+                <a:effectLst/>
+                <a:latin typeface="Arial" panose="020B0604020202020204" pitchFamily="34" charset="0"/>
+                <a:ea typeface="Arial" panose="020B0604020202020204" pitchFamily="34" charset="0"/>
+              </a:rPr>
+              <a:t>*Algorithms framework of respective linear regression model and Random Forest Regressor model</a:t>
+            </a:r>
+          </a:p>
+        </p:txBody>
+      </p:sp>
+      <p:sp>
+        <p:nvSpPr>
+          <p:cNvPr id="15" name="Rectangle 14">
+            <a:extLst>
+              <a:ext uri="{FF2B5EF4-FFF2-40B4-BE49-F238E27FC236}">
+                <a16:creationId xmlns:a16="http://schemas.microsoft.com/office/drawing/2014/main" id="{6A14A7E0-7F30-CF9A-4CFB-552671AB75BC}"/>
+              </a:ext>
+            </a:extLst>
+          </p:cNvPr>
+          <p:cNvSpPr/>
+          <p:nvPr/>
+        </p:nvSpPr>
+        <p:spPr>
+          <a:xfrm>
+            <a:off x="736558" y="3867912"/>
+            <a:ext cx="8041682" cy="614195"/>
+          </a:xfrm>
+          <a:prstGeom prst="rect">
+            <a:avLst/>
+          </a:prstGeom>
+          <a:noFill/>
+          <a:ln w="38100">
+            <a:solidFill>
+              <a:srgbClr val="FF0000"/>
+            </a:solidFill>
+          </a:ln>
+        </p:spPr>
+        <p:style>
+          <a:lnRef idx="2">
+            <a:schemeClr val="accent1">
+              <a:shade val="15000"/>
+            </a:schemeClr>
+          </a:lnRef>
+          <a:fillRef idx="1">
+            <a:schemeClr val="accent1"/>
+          </a:fillRef>
+          <a:effectRef idx="0">
+            <a:schemeClr val="accent1"/>
+          </a:effectRef>
+          <a:fontRef idx="minor">
+            <a:schemeClr val="lt1"/>
+          </a:fontRef>
+        </p:style>
+        <p:txBody>
+          <a:bodyPr rtlCol="0" anchor="ctr"/>
+          <a:lstStyle/>
+          <a:p>
+            <a:pPr algn="ctr"/>
+            <a:endParaRPr lang="en-US"/>
           </a:p>
         </p:txBody>
       </p:sp>
@@ -5308,6 +5547,1089 @@
       </p:grpSpPr>
       <p:sp>
         <p:nvSpPr>
+          <p:cNvPr id="2" name="Title 1">
+            <a:extLst>
+              <a:ext uri="{FF2B5EF4-FFF2-40B4-BE49-F238E27FC236}">
+                <a16:creationId xmlns:a16="http://schemas.microsoft.com/office/drawing/2014/main" id="{F6CC8FB1-239D-41D5-A84F-0A5CE2457274}"/>
+              </a:ext>
+            </a:extLst>
+          </p:cNvPr>
+          <p:cNvSpPr>
+            <a:spLocks noGrp="1"/>
+          </p:cNvSpPr>
+          <p:nvPr>
+            <p:ph type="title"/>
+          </p:nvPr>
+        </p:nvSpPr>
+        <p:spPr>
+          <a:xfrm>
+            <a:off x="822960" y="286604"/>
+            <a:ext cx="7543800" cy="1450757"/>
+          </a:xfrm>
+          <a:ln>
+            <a:noFill/>
+          </a:ln>
+        </p:spPr>
+        <p:txBody>
+          <a:bodyPr>
+            <a:normAutofit/>
+          </a:bodyPr>
+          <a:lstStyle/>
+          <a:p>
+            <a:pPr algn="ctr"/>
+            <a:r>
+              <a:rPr lang="en-US" sz="2800" kern="0" spc="0" dirty="0">
+                <a:solidFill>
+                  <a:srgbClr val="000000"/>
+                </a:solidFill>
+                <a:latin typeface="Arial"/>
+                <a:ea typeface="ＭＳ Ｐゴシック" pitchFamily="-110" charset="-128"/>
+              </a:rPr>
+              <a:t>Random Forest Regressor Model Insight</a:t>
+            </a:r>
+            <a:endParaRPr lang="en-US" sz="3600" dirty="0"/>
+          </a:p>
+        </p:txBody>
+      </p:sp>
+      <p:sp>
+        <p:nvSpPr>
+          <p:cNvPr id="12" name="Slide Number Placeholder 11">
+            <a:extLst>
+              <a:ext uri="{FF2B5EF4-FFF2-40B4-BE49-F238E27FC236}">
+                <a16:creationId xmlns:a16="http://schemas.microsoft.com/office/drawing/2014/main" id="{D0EBE0AB-6F7B-493B-B751-754040CCBFBE}"/>
+              </a:ext>
+            </a:extLst>
+          </p:cNvPr>
+          <p:cNvSpPr>
+            <a:spLocks noGrp="1"/>
+          </p:cNvSpPr>
+          <p:nvPr>
+            <p:ph type="sldNum" sz="quarter" idx="12"/>
+          </p:nvPr>
+        </p:nvSpPr>
+        <p:spPr/>
+        <p:txBody>
+          <a:bodyPr/>
+          <a:lstStyle/>
+          <a:p>
+            <a:fld id="{0B0DCB44-B618-4352-9D00-E38B33038E0B}" type="slidenum">
+              <a:rPr lang="en-US" smtClean="0"/>
+              <a:t>5</a:t>
+            </a:fld>
+            <a:endParaRPr lang="en-US"/>
+          </a:p>
+        </p:txBody>
+      </p:sp>
+      <p:pic>
+        <p:nvPicPr>
+          <p:cNvPr id="3" name="Picture 2" descr="A black background with grey letters&#10;&#10;Description automatically generated">
+            <a:extLst>
+              <a:ext uri="{FF2B5EF4-FFF2-40B4-BE49-F238E27FC236}">
+                <a16:creationId xmlns:a16="http://schemas.microsoft.com/office/drawing/2014/main" id="{695E0685-1926-5C43-CD36-B7BC5961B067}"/>
+              </a:ext>
+            </a:extLst>
+          </p:cNvPr>
+          <p:cNvPicPr>
+            <a:picLocks noChangeAspect="1"/>
+          </p:cNvPicPr>
+          <p:nvPr/>
+        </p:nvPicPr>
+        <p:blipFill>
+          <a:blip r:embed="rId2">
+            <a:extLst>
+              <a:ext uri="{28A0092B-C50C-407E-A947-70E740481C1C}">
+                <a14:useLocalDpi xmlns:a14="http://schemas.microsoft.com/office/drawing/2010/main" val="0"/>
+              </a:ext>
+            </a:extLst>
+          </a:blip>
+          <a:stretch>
+            <a:fillRect/>
+          </a:stretch>
+        </p:blipFill>
+        <p:spPr>
+          <a:xfrm>
+            <a:off x="112832" y="51590"/>
+            <a:ext cx="2121401" cy="707134"/>
+          </a:xfrm>
+          <a:prstGeom prst="rect">
+            <a:avLst/>
+          </a:prstGeom>
+        </p:spPr>
+      </p:pic>
+      <p:sp>
+        <p:nvSpPr>
+          <p:cNvPr id="7" name="Rectangle 6">
+            <a:extLst>
+              <a:ext uri="{FF2B5EF4-FFF2-40B4-BE49-F238E27FC236}">
+                <a16:creationId xmlns:a16="http://schemas.microsoft.com/office/drawing/2014/main" id="{5233713B-17F9-3898-EBAC-760353D3BA61}"/>
+              </a:ext>
+            </a:extLst>
+          </p:cNvPr>
+          <p:cNvSpPr/>
+          <p:nvPr/>
+        </p:nvSpPr>
+        <p:spPr>
+          <a:xfrm>
+            <a:off x="736558" y="1678204"/>
+            <a:ext cx="8163955" cy="1631216"/>
+          </a:xfrm>
+          <a:prstGeom prst="rect">
+            <a:avLst/>
+          </a:prstGeom>
+        </p:spPr>
+        <p:txBody>
+          <a:bodyPr wrap="square">
+            <a:spAutoFit/>
+          </a:bodyPr>
+          <a:lstStyle/>
+          <a:p>
+            <a:endParaRPr lang="en-US" sz="2000" dirty="0">
+              <a:latin typeface="Arial" panose="020B0604020202020204" pitchFamily="34" charset="0"/>
+              <a:cs typeface="Arial" panose="020B0604020202020204" pitchFamily="34" charset="0"/>
+            </a:endParaRPr>
+          </a:p>
+          <a:p>
+            <a:pPr marL="285750" indent="-285750">
+              <a:buFont typeface="Arial" panose="020B0604020202020204" pitchFamily="34" charset="0"/>
+              <a:buChar char="•"/>
+            </a:pPr>
+            <a:r>
+              <a:rPr lang="en-US" sz="2000" dirty="0">
+                <a:effectLst/>
+                <a:latin typeface="Arial" panose="020B0604020202020204" pitchFamily="34" charset="0"/>
+                <a:ea typeface="Arial" panose="020B0604020202020204" pitchFamily="34" charset="0"/>
+              </a:rPr>
+              <a:t>Big Mountain Ski Resort </a:t>
+            </a:r>
+            <a:r>
+              <a:rPr lang="en-US" sz="2000" b="1" dirty="0">
+                <a:effectLst/>
+                <a:latin typeface="Arial" panose="020B0604020202020204" pitchFamily="34" charset="0"/>
+                <a:ea typeface="Arial" panose="020B0604020202020204" pitchFamily="34" charset="0"/>
+              </a:rPr>
+              <a:t>seems to be underselling</a:t>
+            </a:r>
+            <a:r>
+              <a:rPr lang="en-US" sz="2000" dirty="0">
+                <a:effectLst/>
+                <a:latin typeface="Arial" panose="020B0604020202020204" pitchFamily="34" charset="0"/>
+                <a:ea typeface="Arial" panose="020B0604020202020204" pitchFamily="34" charset="0"/>
+              </a:rPr>
+              <a:t> their resort as the </a:t>
+            </a:r>
+            <a:r>
+              <a:rPr lang="en-US" sz="2000" b="1" dirty="0">
+                <a:effectLst/>
+                <a:latin typeface="Arial" panose="020B0604020202020204" pitchFamily="34" charset="0"/>
+                <a:ea typeface="Arial" panose="020B0604020202020204" pitchFamily="34" charset="0"/>
+              </a:rPr>
+              <a:t>predicted price is about $95</a:t>
+            </a:r>
+            <a:r>
+              <a:rPr lang="en-US" sz="2000" dirty="0">
+                <a:effectLst/>
+                <a:latin typeface="Arial" panose="020B0604020202020204" pitchFamily="34" charset="0"/>
+                <a:ea typeface="Arial" panose="020B0604020202020204" pitchFamily="34" charset="0"/>
+              </a:rPr>
+              <a:t> when the </a:t>
+            </a:r>
+            <a:r>
+              <a:rPr lang="en-US" sz="2000" b="1" dirty="0">
+                <a:effectLst/>
+                <a:latin typeface="Arial" panose="020B0604020202020204" pitchFamily="34" charset="0"/>
+                <a:ea typeface="Arial" panose="020B0604020202020204" pitchFamily="34" charset="0"/>
+              </a:rPr>
+              <a:t>actual price</a:t>
+            </a:r>
+            <a:r>
+              <a:rPr lang="en-US" sz="2000" dirty="0">
+                <a:effectLst/>
+                <a:latin typeface="Arial" panose="020B0604020202020204" pitchFamily="34" charset="0"/>
+                <a:ea typeface="Arial" panose="020B0604020202020204" pitchFamily="34" charset="0"/>
+              </a:rPr>
+              <a:t> in the </a:t>
+            </a:r>
+            <a:r>
+              <a:rPr lang="en-US" sz="2000" dirty="0" err="1">
+                <a:effectLst/>
+                <a:latin typeface="Arial" panose="020B0604020202020204" pitchFamily="34" charset="0"/>
+                <a:ea typeface="Arial" panose="020B0604020202020204" pitchFamily="34" charset="0"/>
+              </a:rPr>
+              <a:t>AdultWeekend</a:t>
+            </a:r>
+            <a:r>
+              <a:rPr lang="en-US" sz="2000" dirty="0">
+                <a:effectLst/>
+                <a:latin typeface="Arial" panose="020B0604020202020204" pitchFamily="34" charset="0"/>
+                <a:ea typeface="Arial" panose="020B0604020202020204" pitchFamily="34" charset="0"/>
+              </a:rPr>
+              <a:t> price column </a:t>
+            </a:r>
+            <a:r>
+              <a:rPr lang="en-US" sz="2000" b="1" dirty="0">
+                <a:effectLst/>
+                <a:latin typeface="Arial" panose="020B0604020202020204" pitchFamily="34" charset="0"/>
+                <a:ea typeface="Arial" panose="020B0604020202020204" pitchFamily="34" charset="0"/>
+              </a:rPr>
+              <a:t>is $81 </a:t>
+            </a:r>
+            <a:r>
+              <a:rPr lang="en-US" sz="2000" dirty="0">
+                <a:effectLst/>
+                <a:latin typeface="Arial" panose="020B0604020202020204" pitchFamily="34" charset="0"/>
+                <a:ea typeface="Arial" panose="020B0604020202020204" pitchFamily="34" charset="0"/>
+              </a:rPr>
+              <a:t>compared with other resorts of its caliber. </a:t>
+            </a:r>
+            <a:endParaRPr lang="en-US" sz="2000" dirty="0">
+              <a:latin typeface="Arial" panose="020B0604020202020204" pitchFamily="34" charset="0"/>
+              <a:cs typeface="Arial" panose="020B0604020202020204" pitchFamily="34" charset="0"/>
+            </a:endParaRPr>
+          </a:p>
+        </p:txBody>
+      </p:sp>
+      <p:pic>
+        <p:nvPicPr>
+          <p:cNvPr id="4" name="image14.png">
+            <a:extLst>
+              <a:ext uri="{FF2B5EF4-FFF2-40B4-BE49-F238E27FC236}">
+                <a16:creationId xmlns:a16="http://schemas.microsoft.com/office/drawing/2014/main" id="{458ED99F-C824-DBA5-81BA-FA41BDDF875A}"/>
+              </a:ext>
+            </a:extLst>
+          </p:cNvPr>
+          <p:cNvPicPr/>
+          <p:nvPr/>
+        </p:nvPicPr>
+        <p:blipFill>
+          <a:blip r:embed="rId3"/>
+          <a:srcRect/>
+          <a:stretch>
+            <a:fillRect/>
+          </a:stretch>
+        </p:blipFill>
+        <p:spPr>
+          <a:xfrm>
+            <a:off x="667512" y="3429000"/>
+            <a:ext cx="3574781" cy="2196467"/>
+          </a:xfrm>
+          <a:prstGeom prst="rect">
+            <a:avLst/>
+          </a:prstGeom>
+          <a:ln/>
+        </p:spPr>
+      </p:pic>
+      <p:pic>
+        <p:nvPicPr>
+          <p:cNvPr id="18" name="image17.png">
+            <a:extLst>
+              <a:ext uri="{FF2B5EF4-FFF2-40B4-BE49-F238E27FC236}">
+                <a16:creationId xmlns:a16="http://schemas.microsoft.com/office/drawing/2014/main" id="{ACD77EEC-9D86-0753-450E-73183109E02F}"/>
+              </a:ext>
+            </a:extLst>
+          </p:cNvPr>
+          <p:cNvPicPr/>
+          <p:nvPr/>
+        </p:nvPicPr>
+        <p:blipFill>
+          <a:blip r:embed="rId4"/>
+          <a:srcRect/>
+          <a:stretch>
+            <a:fillRect/>
+          </a:stretch>
+        </p:blipFill>
+        <p:spPr>
+          <a:xfrm>
+            <a:off x="4355211" y="3128961"/>
+            <a:ext cx="2219325" cy="1296735"/>
+          </a:xfrm>
+          <a:prstGeom prst="rect">
+            <a:avLst/>
+          </a:prstGeom>
+          <a:ln/>
+        </p:spPr>
+      </p:pic>
+      <p:pic>
+        <p:nvPicPr>
+          <p:cNvPr id="19" name="image12.png">
+            <a:extLst>
+              <a:ext uri="{FF2B5EF4-FFF2-40B4-BE49-F238E27FC236}">
+                <a16:creationId xmlns:a16="http://schemas.microsoft.com/office/drawing/2014/main" id="{3A4CCAE9-C5D6-3396-0E0B-DB4EED7DFF66}"/>
+              </a:ext>
+            </a:extLst>
+          </p:cNvPr>
+          <p:cNvPicPr/>
+          <p:nvPr/>
+        </p:nvPicPr>
+        <p:blipFill>
+          <a:blip r:embed="rId5"/>
+          <a:srcRect/>
+          <a:stretch>
+            <a:fillRect/>
+          </a:stretch>
+        </p:blipFill>
+        <p:spPr>
+          <a:xfrm>
+            <a:off x="6626528" y="3129965"/>
+            <a:ext cx="2221992" cy="1298448"/>
+          </a:xfrm>
+          <a:prstGeom prst="rect">
+            <a:avLst/>
+          </a:prstGeom>
+          <a:ln/>
+        </p:spPr>
+      </p:pic>
+      <p:pic>
+        <p:nvPicPr>
+          <p:cNvPr id="20" name="image13.png">
+            <a:extLst>
+              <a:ext uri="{FF2B5EF4-FFF2-40B4-BE49-F238E27FC236}">
+                <a16:creationId xmlns:a16="http://schemas.microsoft.com/office/drawing/2014/main" id="{312AE700-685D-F829-8531-BD8845ECD922}"/>
+              </a:ext>
+            </a:extLst>
+          </p:cNvPr>
+          <p:cNvPicPr/>
+          <p:nvPr/>
+        </p:nvPicPr>
+        <p:blipFill>
+          <a:blip r:embed="rId6"/>
+          <a:srcRect/>
+          <a:stretch>
+            <a:fillRect/>
+          </a:stretch>
+        </p:blipFill>
+        <p:spPr>
+          <a:xfrm>
+            <a:off x="4404536" y="4530572"/>
+            <a:ext cx="2221992" cy="1298448"/>
+          </a:xfrm>
+          <a:prstGeom prst="rect">
+            <a:avLst/>
+          </a:prstGeom>
+          <a:ln/>
+        </p:spPr>
+      </p:pic>
+      <p:pic>
+        <p:nvPicPr>
+          <p:cNvPr id="21" name="image4.png">
+            <a:extLst>
+              <a:ext uri="{FF2B5EF4-FFF2-40B4-BE49-F238E27FC236}">
+                <a16:creationId xmlns:a16="http://schemas.microsoft.com/office/drawing/2014/main" id="{2F3D841B-05B3-E55D-7DCF-8F220D6C6710}"/>
+              </a:ext>
+            </a:extLst>
+          </p:cNvPr>
+          <p:cNvPicPr/>
+          <p:nvPr/>
+        </p:nvPicPr>
+        <p:blipFill>
+          <a:blip r:embed="rId7"/>
+          <a:srcRect/>
+          <a:stretch>
+            <a:fillRect/>
+          </a:stretch>
+        </p:blipFill>
+        <p:spPr>
+          <a:xfrm>
+            <a:off x="6678521" y="4530572"/>
+            <a:ext cx="2221992" cy="1298448"/>
+          </a:xfrm>
+          <a:prstGeom prst="rect">
+            <a:avLst/>
+          </a:prstGeom>
+          <a:ln/>
+        </p:spPr>
+      </p:pic>
+      <p:sp>
+        <p:nvSpPr>
+          <p:cNvPr id="23" name="TextBox 22">
+            <a:extLst>
+              <a:ext uri="{FF2B5EF4-FFF2-40B4-BE49-F238E27FC236}">
+                <a16:creationId xmlns:a16="http://schemas.microsoft.com/office/drawing/2014/main" id="{BCDE46A6-F7DA-C60D-345D-3AA2FBD8289B}"/>
+              </a:ext>
+            </a:extLst>
+          </p:cNvPr>
+          <p:cNvSpPr txBox="1"/>
+          <p:nvPr/>
+        </p:nvSpPr>
+        <p:spPr>
+          <a:xfrm>
+            <a:off x="736558" y="5625467"/>
+            <a:ext cx="3474720" cy="221856"/>
+          </a:xfrm>
+          <a:prstGeom prst="rect">
+            <a:avLst/>
+          </a:prstGeom>
+          <a:noFill/>
+        </p:spPr>
+        <p:txBody>
+          <a:bodyPr wrap="square">
+            <a:spAutoFit/>
+          </a:bodyPr>
+          <a:lstStyle/>
+          <a:p>
+            <a:pPr marL="0" marR="0">
+              <a:lnSpc>
+                <a:spcPct val="115000"/>
+              </a:lnSpc>
+              <a:spcBef>
+                <a:spcPts val="0"/>
+              </a:spcBef>
+              <a:spcAft>
+                <a:spcPts val="0"/>
+              </a:spcAft>
+            </a:pPr>
+            <a:r>
+              <a:rPr lang="en-US" sz="800" dirty="0">
+                <a:effectLst/>
+                <a:latin typeface="Arial" panose="020B0604020202020204" pitchFamily="34" charset="0"/>
+                <a:ea typeface="Arial" panose="020B0604020202020204" pitchFamily="34" charset="0"/>
+              </a:rPr>
+              <a:t>*</a:t>
+            </a:r>
+            <a:r>
+              <a:rPr lang="en-US" sz="800" dirty="0" err="1">
+                <a:effectLst/>
+                <a:latin typeface="Arial" panose="020B0604020202020204" pitchFamily="34" charset="0"/>
+                <a:ea typeface="Arial" panose="020B0604020202020204" pitchFamily="34" charset="0"/>
+              </a:rPr>
+              <a:t>AdultWeekend</a:t>
+            </a:r>
+            <a:r>
+              <a:rPr lang="en-US" sz="800" dirty="0">
+                <a:effectLst/>
+                <a:latin typeface="Arial" panose="020B0604020202020204" pitchFamily="34" charset="0"/>
+                <a:ea typeface="Arial" panose="020B0604020202020204" pitchFamily="34" charset="0"/>
+              </a:rPr>
+              <a:t> Ticket price of Big Mountain with entire market share</a:t>
+            </a:r>
+          </a:p>
+        </p:txBody>
+      </p:sp>
+      <p:sp>
+        <p:nvSpPr>
+          <p:cNvPr id="25" name="TextBox 24">
+            <a:extLst>
+              <a:ext uri="{FF2B5EF4-FFF2-40B4-BE49-F238E27FC236}">
+                <a16:creationId xmlns:a16="http://schemas.microsoft.com/office/drawing/2014/main" id="{1ECE7246-C79D-2306-7A42-6538A789B63F}"/>
+              </a:ext>
+            </a:extLst>
+          </p:cNvPr>
+          <p:cNvSpPr txBox="1"/>
+          <p:nvPr/>
+        </p:nvSpPr>
+        <p:spPr>
+          <a:xfrm>
+            <a:off x="4404536" y="5821237"/>
+            <a:ext cx="4572000" cy="215444"/>
+          </a:xfrm>
+          <a:prstGeom prst="rect">
+            <a:avLst/>
+          </a:prstGeom>
+          <a:noFill/>
+        </p:spPr>
+        <p:txBody>
+          <a:bodyPr wrap="square">
+            <a:spAutoFit/>
+          </a:bodyPr>
+          <a:lstStyle/>
+          <a:p>
+            <a:r>
+              <a:rPr lang="en-US" sz="800" dirty="0">
+                <a:latin typeface="Arial" panose="020B0604020202020204" pitchFamily="34" charset="0"/>
+              </a:rPr>
+              <a:t>*Big Mountain Ski Resort feature behavior compared with entire market share</a:t>
+            </a:r>
+            <a:endParaRPr lang="en-US" sz="800" dirty="0"/>
+          </a:p>
+        </p:txBody>
+      </p:sp>
+    </p:spTree>
+    <p:extLst>
+      <p:ext uri="{BB962C8B-B14F-4D97-AF65-F5344CB8AC3E}">
+        <p14:creationId xmlns:p14="http://schemas.microsoft.com/office/powerpoint/2010/main" val="1251914688"/>
+      </p:ext>
+    </p:extLst>
+  </p:cSld>
+  <p:clrMapOvr>
+    <a:masterClrMapping/>
+  </p:clrMapOvr>
+</p:sld>
+</file>
+
+<file path=ppt/slides/slide6.xml><?xml version="1.0" encoding="utf-8"?>
+<p:sld xmlns:a="http://schemas.openxmlformats.org/drawingml/2006/main" xmlns:r="http://schemas.openxmlformats.org/officeDocument/2006/relationships" xmlns:p="http://schemas.openxmlformats.org/presentationml/2006/main">
+  <p:cSld>
+    <p:spTree>
+      <p:nvGrpSpPr>
+        <p:cNvPr id="1" name=""/>
+        <p:cNvGrpSpPr/>
+        <p:nvPr/>
+      </p:nvGrpSpPr>
+      <p:grpSpPr>
+        <a:xfrm>
+          <a:off x="0" y="0"/>
+          <a:ext cx="0" cy="0"/>
+          <a:chOff x="0" y="0"/>
+          <a:chExt cx="0" cy="0"/>
+        </a:xfrm>
+      </p:grpSpPr>
+      <p:sp>
+        <p:nvSpPr>
+          <p:cNvPr id="2" name="Title 1">
+            <a:extLst>
+              <a:ext uri="{FF2B5EF4-FFF2-40B4-BE49-F238E27FC236}">
+                <a16:creationId xmlns:a16="http://schemas.microsoft.com/office/drawing/2014/main" id="{F6CC8FB1-239D-41D5-A84F-0A5CE2457274}"/>
+              </a:ext>
+            </a:extLst>
+          </p:cNvPr>
+          <p:cNvSpPr>
+            <a:spLocks noGrp="1"/>
+          </p:cNvSpPr>
+          <p:nvPr>
+            <p:ph type="title"/>
+          </p:nvPr>
+        </p:nvSpPr>
+        <p:spPr>
+          <a:xfrm>
+            <a:off x="822960" y="286604"/>
+            <a:ext cx="7543800" cy="1450757"/>
+          </a:xfrm>
+          <a:ln>
+            <a:noFill/>
+          </a:ln>
+        </p:spPr>
+        <p:txBody>
+          <a:bodyPr>
+            <a:normAutofit/>
+          </a:bodyPr>
+          <a:lstStyle/>
+          <a:p>
+            <a:pPr algn="ctr"/>
+            <a:r>
+              <a:rPr lang="en-US" sz="4000" kern="0" spc="0" dirty="0">
+                <a:solidFill>
+                  <a:srgbClr val="000000"/>
+                </a:solidFill>
+                <a:latin typeface="Arial"/>
+                <a:ea typeface="ＭＳ Ｐゴシック" pitchFamily="-110" charset="-128"/>
+              </a:rPr>
+              <a:t>Examining Business Strategies</a:t>
+            </a:r>
+            <a:endParaRPr lang="en-US" sz="4000" dirty="0"/>
+          </a:p>
+        </p:txBody>
+      </p:sp>
+      <p:sp>
+        <p:nvSpPr>
+          <p:cNvPr id="12" name="Slide Number Placeholder 11">
+            <a:extLst>
+              <a:ext uri="{FF2B5EF4-FFF2-40B4-BE49-F238E27FC236}">
+                <a16:creationId xmlns:a16="http://schemas.microsoft.com/office/drawing/2014/main" id="{D0EBE0AB-6F7B-493B-B751-754040CCBFBE}"/>
+              </a:ext>
+            </a:extLst>
+          </p:cNvPr>
+          <p:cNvSpPr>
+            <a:spLocks noGrp="1"/>
+          </p:cNvSpPr>
+          <p:nvPr>
+            <p:ph type="sldNum" sz="quarter" idx="12"/>
+          </p:nvPr>
+        </p:nvSpPr>
+        <p:spPr/>
+        <p:txBody>
+          <a:bodyPr/>
+          <a:lstStyle/>
+          <a:p>
+            <a:fld id="{0B0DCB44-B618-4352-9D00-E38B33038E0B}" type="slidenum">
+              <a:rPr lang="en-US" smtClean="0"/>
+              <a:t>6</a:t>
+            </a:fld>
+            <a:endParaRPr lang="en-US"/>
+          </a:p>
+        </p:txBody>
+      </p:sp>
+      <p:pic>
+        <p:nvPicPr>
+          <p:cNvPr id="3" name="Picture 2" descr="A black background with grey letters&#10;&#10;Description automatically generated">
+            <a:extLst>
+              <a:ext uri="{FF2B5EF4-FFF2-40B4-BE49-F238E27FC236}">
+                <a16:creationId xmlns:a16="http://schemas.microsoft.com/office/drawing/2014/main" id="{695E0685-1926-5C43-CD36-B7BC5961B067}"/>
+              </a:ext>
+            </a:extLst>
+          </p:cNvPr>
+          <p:cNvPicPr>
+            <a:picLocks noChangeAspect="1"/>
+          </p:cNvPicPr>
+          <p:nvPr/>
+        </p:nvPicPr>
+        <p:blipFill>
+          <a:blip r:embed="rId2">
+            <a:extLst>
+              <a:ext uri="{28A0092B-C50C-407E-A947-70E740481C1C}">
+                <a14:useLocalDpi xmlns:a14="http://schemas.microsoft.com/office/drawing/2010/main" val="0"/>
+              </a:ext>
+            </a:extLst>
+          </a:blip>
+          <a:stretch>
+            <a:fillRect/>
+          </a:stretch>
+        </p:blipFill>
+        <p:spPr>
+          <a:xfrm>
+            <a:off x="112832" y="51590"/>
+            <a:ext cx="2121401" cy="707134"/>
+          </a:xfrm>
+          <a:prstGeom prst="rect">
+            <a:avLst/>
+          </a:prstGeom>
+        </p:spPr>
+      </p:pic>
+      <p:sp>
+        <p:nvSpPr>
+          <p:cNvPr id="7" name="Rectangle 6">
+            <a:extLst>
+              <a:ext uri="{FF2B5EF4-FFF2-40B4-BE49-F238E27FC236}">
+                <a16:creationId xmlns:a16="http://schemas.microsoft.com/office/drawing/2014/main" id="{5233713B-17F9-3898-EBAC-760353D3BA61}"/>
+              </a:ext>
+            </a:extLst>
+          </p:cNvPr>
+          <p:cNvSpPr/>
+          <p:nvPr/>
+        </p:nvSpPr>
+        <p:spPr>
+          <a:xfrm>
+            <a:off x="822959" y="4881823"/>
+            <a:ext cx="8163955" cy="1261884"/>
+          </a:xfrm>
+          <a:prstGeom prst="rect">
+            <a:avLst/>
+          </a:prstGeom>
+        </p:spPr>
+        <p:txBody>
+          <a:bodyPr wrap="square">
+            <a:spAutoFit/>
+          </a:bodyPr>
+          <a:lstStyle/>
+          <a:p>
+            <a:endParaRPr lang="en-US" sz="2000" dirty="0">
+              <a:latin typeface="Arial" panose="020B0604020202020204" pitchFamily="34" charset="0"/>
+              <a:cs typeface="Arial" panose="020B0604020202020204" pitchFamily="34" charset="0"/>
+            </a:endParaRPr>
+          </a:p>
+          <a:p>
+            <a:pPr marL="285750" indent="-285750">
+              <a:buFont typeface="Arial" panose="020B0604020202020204" pitchFamily="34" charset="0"/>
+              <a:buChar char="•"/>
+            </a:pPr>
+            <a:r>
+              <a:rPr lang="en-US" sz="1400" dirty="0">
+                <a:latin typeface="Arial" panose="020B0604020202020204" pitchFamily="34" charset="0"/>
+                <a:cs typeface="Arial" panose="020B0604020202020204" pitchFamily="34" charset="0"/>
+              </a:rPr>
+              <a:t>Out of the business strategies tested, if a resort adds a chair lift, it would be in best interest if the resort also adds another run as well as a vertical drop distance of 150 feet and increases their snow covered by snow making machines by 2 acres. This leads to a ticket support price of $9.90 dollars which still gives Big Mountain Ski Resort a competitive market price. </a:t>
+            </a:r>
+          </a:p>
+        </p:txBody>
+      </p:sp>
+      <p:pic>
+        <p:nvPicPr>
+          <p:cNvPr id="6" name="Picture 5">
+            <a:extLst>
+              <a:ext uri="{FF2B5EF4-FFF2-40B4-BE49-F238E27FC236}">
+                <a16:creationId xmlns:a16="http://schemas.microsoft.com/office/drawing/2014/main" id="{38BCEB13-290C-7F0E-903D-E18105EFA87B}"/>
+              </a:ext>
+            </a:extLst>
+          </p:cNvPr>
+          <p:cNvPicPr>
+            <a:picLocks noChangeAspect="1"/>
+          </p:cNvPicPr>
+          <p:nvPr/>
+        </p:nvPicPr>
+        <p:blipFill>
+          <a:blip r:embed="rId3"/>
+          <a:stretch>
+            <a:fillRect/>
+          </a:stretch>
+        </p:blipFill>
+        <p:spPr>
+          <a:xfrm>
+            <a:off x="822959" y="1859666"/>
+            <a:ext cx="3607595" cy="988321"/>
+          </a:xfrm>
+          <a:prstGeom prst="rect">
+            <a:avLst/>
+          </a:prstGeom>
+        </p:spPr>
+      </p:pic>
+      <p:pic>
+        <p:nvPicPr>
+          <p:cNvPr id="9" name="Picture 8">
+            <a:extLst>
+              <a:ext uri="{FF2B5EF4-FFF2-40B4-BE49-F238E27FC236}">
+                <a16:creationId xmlns:a16="http://schemas.microsoft.com/office/drawing/2014/main" id="{54B10F63-EC8B-A0FE-54FB-2D937529F8CC}"/>
+              </a:ext>
+            </a:extLst>
+          </p:cNvPr>
+          <p:cNvPicPr>
+            <a:picLocks noChangeAspect="1"/>
+          </p:cNvPicPr>
+          <p:nvPr/>
+        </p:nvPicPr>
+        <p:blipFill>
+          <a:blip r:embed="rId4"/>
+          <a:stretch>
+            <a:fillRect/>
+          </a:stretch>
+        </p:blipFill>
+        <p:spPr>
+          <a:xfrm>
+            <a:off x="4572000" y="1853575"/>
+            <a:ext cx="3901703" cy="824716"/>
+          </a:xfrm>
+          <a:prstGeom prst="rect">
+            <a:avLst/>
+          </a:prstGeom>
+        </p:spPr>
+      </p:pic>
+      <p:pic>
+        <p:nvPicPr>
+          <p:cNvPr id="11" name="Picture 10">
+            <a:extLst>
+              <a:ext uri="{FF2B5EF4-FFF2-40B4-BE49-F238E27FC236}">
+                <a16:creationId xmlns:a16="http://schemas.microsoft.com/office/drawing/2014/main" id="{5677F00E-C953-3152-5DF5-A08C47D6C6E0}"/>
+              </a:ext>
+            </a:extLst>
+          </p:cNvPr>
+          <p:cNvPicPr>
+            <a:picLocks noChangeAspect="1"/>
+          </p:cNvPicPr>
+          <p:nvPr/>
+        </p:nvPicPr>
+        <p:blipFill>
+          <a:blip r:embed="rId5"/>
+          <a:stretch>
+            <a:fillRect/>
+          </a:stretch>
+        </p:blipFill>
+        <p:spPr>
+          <a:xfrm>
+            <a:off x="4771577" y="3218567"/>
+            <a:ext cx="1530164" cy="1546237"/>
+          </a:xfrm>
+          <a:prstGeom prst="rect">
+            <a:avLst/>
+          </a:prstGeom>
+        </p:spPr>
+      </p:pic>
+      <p:pic>
+        <p:nvPicPr>
+          <p:cNvPr id="14" name="Picture 13">
+            <a:extLst>
+              <a:ext uri="{FF2B5EF4-FFF2-40B4-BE49-F238E27FC236}">
+                <a16:creationId xmlns:a16="http://schemas.microsoft.com/office/drawing/2014/main" id="{08BF6736-42D5-C2F2-29F3-D8F9F609A07B}"/>
+              </a:ext>
+            </a:extLst>
+          </p:cNvPr>
+          <p:cNvPicPr>
+            <a:picLocks noChangeAspect="1"/>
+          </p:cNvPicPr>
+          <p:nvPr/>
+        </p:nvPicPr>
+        <p:blipFill>
+          <a:blip r:embed="rId6"/>
+          <a:stretch>
+            <a:fillRect/>
+          </a:stretch>
+        </p:blipFill>
+        <p:spPr>
+          <a:xfrm>
+            <a:off x="745854" y="3245247"/>
+            <a:ext cx="3684700" cy="549209"/>
+          </a:xfrm>
+          <a:prstGeom prst="rect">
+            <a:avLst/>
+          </a:prstGeom>
+        </p:spPr>
+      </p:pic>
+      <p:sp>
+        <p:nvSpPr>
+          <p:cNvPr id="15" name="TextBox 14">
+            <a:extLst>
+              <a:ext uri="{FF2B5EF4-FFF2-40B4-BE49-F238E27FC236}">
+                <a16:creationId xmlns:a16="http://schemas.microsoft.com/office/drawing/2014/main" id="{1A2ECE59-A0E7-D30D-515F-DE7515F61B0B}"/>
+              </a:ext>
+            </a:extLst>
+          </p:cNvPr>
+          <p:cNvSpPr txBox="1"/>
+          <p:nvPr/>
+        </p:nvSpPr>
+        <p:spPr>
+          <a:xfrm>
+            <a:off x="745854" y="2787900"/>
+            <a:ext cx="3770962" cy="363433"/>
+          </a:xfrm>
+          <a:prstGeom prst="rect">
+            <a:avLst/>
+          </a:prstGeom>
+          <a:noFill/>
+        </p:spPr>
+        <p:txBody>
+          <a:bodyPr wrap="square">
+            <a:spAutoFit/>
+          </a:bodyPr>
+          <a:lstStyle/>
+          <a:p>
+            <a:pPr marL="0" marR="0">
+              <a:lnSpc>
+                <a:spcPct val="115000"/>
+              </a:lnSpc>
+              <a:spcBef>
+                <a:spcPts val="1200"/>
+              </a:spcBef>
+              <a:spcAft>
+                <a:spcPts val="1200"/>
+              </a:spcAft>
+            </a:pPr>
+            <a:r>
+              <a:rPr lang="en-US" sz="800" dirty="0">
+                <a:effectLst/>
+                <a:latin typeface="Arial" panose="020B0604020202020204" pitchFamily="34" charset="0"/>
+                <a:ea typeface="Arial" panose="020B0604020202020204" pitchFamily="34" charset="0"/>
+              </a:rPr>
+              <a:t>*</a:t>
+            </a:r>
+            <a:r>
+              <a:rPr lang="en-US" sz="800" dirty="0">
+                <a:latin typeface="Arial" panose="020B0604020202020204" pitchFamily="34" charset="0"/>
+                <a:ea typeface="Arial" panose="020B0604020202020204" pitchFamily="34" charset="0"/>
+              </a:rPr>
+              <a:t>Business Case 1: Increase Runs, Vertical Drop Distance, and total chairs at a resort</a:t>
+            </a:r>
+            <a:endParaRPr lang="en-US" sz="800" dirty="0">
+              <a:effectLst/>
+              <a:latin typeface="Arial" panose="020B0604020202020204" pitchFamily="34" charset="0"/>
+              <a:ea typeface="Arial" panose="020B0604020202020204" pitchFamily="34" charset="0"/>
+            </a:endParaRPr>
+          </a:p>
+        </p:txBody>
+      </p:sp>
+      <p:sp>
+        <p:nvSpPr>
+          <p:cNvPr id="16" name="TextBox 15">
+            <a:extLst>
+              <a:ext uri="{FF2B5EF4-FFF2-40B4-BE49-F238E27FC236}">
+                <a16:creationId xmlns:a16="http://schemas.microsoft.com/office/drawing/2014/main" id="{5D023D8A-240E-38CB-F89D-558F91E691CD}"/>
+              </a:ext>
+            </a:extLst>
+          </p:cNvPr>
+          <p:cNvSpPr txBox="1"/>
+          <p:nvPr/>
+        </p:nvSpPr>
+        <p:spPr>
+          <a:xfrm>
+            <a:off x="4502159" y="2807551"/>
+            <a:ext cx="4641841" cy="363433"/>
+          </a:xfrm>
+          <a:prstGeom prst="rect">
+            <a:avLst/>
+          </a:prstGeom>
+          <a:noFill/>
+        </p:spPr>
+        <p:txBody>
+          <a:bodyPr wrap="square">
+            <a:spAutoFit/>
+          </a:bodyPr>
+          <a:lstStyle/>
+          <a:p>
+            <a:pPr marL="0" marR="0">
+              <a:lnSpc>
+                <a:spcPct val="115000"/>
+              </a:lnSpc>
+              <a:spcBef>
+                <a:spcPts val="1200"/>
+              </a:spcBef>
+              <a:spcAft>
+                <a:spcPts val="1200"/>
+              </a:spcAft>
+            </a:pPr>
+            <a:r>
+              <a:rPr lang="en-US" sz="800" dirty="0">
+                <a:effectLst/>
+                <a:latin typeface="Arial" panose="020B0604020202020204" pitchFamily="34" charset="0"/>
+                <a:ea typeface="Arial" panose="020B0604020202020204" pitchFamily="34" charset="0"/>
+              </a:rPr>
+              <a:t>*</a:t>
+            </a:r>
+            <a:r>
+              <a:rPr lang="en-US" sz="800" dirty="0">
+                <a:latin typeface="Arial" panose="020B0604020202020204" pitchFamily="34" charset="0"/>
+                <a:ea typeface="Arial" panose="020B0604020202020204" pitchFamily="34" charset="0"/>
+              </a:rPr>
+              <a:t>Business Case 2: Increase Runs, Vertical Drop Distance, snow making machine area, and total chairs at a resort</a:t>
+            </a:r>
+            <a:endParaRPr lang="en-US" sz="800" dirty="0">
+              <a:effectLst/>
+              <a:latin typeface="Arial" panose="020B0604020202020204" pitchFamily="34" charset="0"/>
+              <a:ea typeface="Arial" panose="020B0604020202020204" pitchFamily="34" charset="0"/>
+            </a:endParaRPr>
+          </a:p>
+        </p:txBody>
+      </p:sp>
+      <p:sp>
+        <p:nvSpPr>
+          <p:cNvPr id="17" name="TextBox 16">
+            <a:extLst>
+              <a:ext uri="{FF2B5EF4-FFF2-40B4-BE49-F238E27FC236}">
+                <a16:creationId xmlns:a16="http://schemas.microsoft.com/office/drawing/2014/main" id="{DC37F51E-10CC-7AE3-27D5-786B8155C63C}"/>
+              </a:ext>
+            </a:extLst>
+          </p:cNvPr>
+          <p:cNvSpPr txBox="1"/>
+          <p:nvPr/>
+        </p:nvSpPr>
+        <p:spPr>
+          <a:xfrm>
+            <a:off x="636446" y="3769829"/>
+            <a:ext cx="4641841" cy="221856"/>
+          </a:xfrm>
+          <a:prstGeom prst="rect">
+            <a:avLst/>
+          </a:prstGeom>
+          <a:noFill/>
+        </p:spPr>
+        <p:txBody>
+          <a:bodyPr wrap="square">
+            <a:spAutoFit/>
+          </a:bodyPr>
+          <a:lstStyle/>
+          <a:p>
+            <a:pPr marL="0" marR="0">
+              <a:lnSpc>
+                <a:spcPct val="115000"/>
+              </a:lnSpc>
+              <a:spcBef>
+                <a:spcPts val="1200"/>
+              </a:spcBef>
+              <a:spcAft>
+                <a:spcPts val="1200"/>
+              </a:spcAft>
+            </a:pPr>
+            <a:r>
+              <a:rPr lang="en-US" sz="800" dirty="0">
+                <a:effectLst/>
+                <a:latin typeface="Arial" panose="020B0604020202020204" pitchFamily="34" charset="0"/>
+                <a:ea typeface="Arial" panose="020B0604020202020204" pitchFamily="34" charset="0"/>
+              </a:rPr>
+              <a:t>*</a:t>
+            </a:r>
+            <a:r>
+              <a:rPr lang="en-US" sz="800" dirty="0">
+                <a:latin typeface="Arial" panose="020B0604020202020204" pitchFamily="34" charset="0"/>
+                <a:ea typeface="Arial" panose="020B0604020202020204" pitchFamily="34" charset="0"/>
+              </a:rPr>
+              <a:t>Business Case 3: Increase miles for the longest run and snow making machine area</a:t>
+            </a:r>
+            <a:endParaRPr lang="en-US" sz="800" dirty="0">
+              <a:effectLst/>
+              <a:latin typeface="Arial" panose="020B0604020202020204" pitchFamily="34" charset="0"/>
+              <a:ea typeface="Arial" panose="020B0604020202020204" pitchFamily="34" charset="0"/>
+            </a:endParaRPr>
+          </a:p>
+        </p:txBody>
+      </p:sp>
+      <p:sp>
+        <p:nvSpPr>
+          <p:cNvPr id="22" name="TextBox 21">
+            <a:extLst>
+              <a:ext uri="{FF2B5EF4-FFF2-40B4-BE49-F238E27FC236}">
+                <a16:creationId xmlns:a16="http://schemas.microsoft.com/office/drawing/2014/main" id="{2A2CDA24-1ABC-EB31-62D2-C3B83A2DA9E8}"/>
+              </a:ext>
+            </a:extLst>
+          </p:cNvPr>
+          <p:cNvSpPr txBox="1"/>
+          <p:nvPr/>
+        </p:nvSpPr>
+        <p:spPr>
+          <a:xfrm>
+            <a:off x="4771577" y="4777932"/>
+            <a:ext cx="4641841" cy="221856"/>
+          </a:xfrm>
+          <a:prstGeom prst="rect">
+            <a:avLst/>
+          </a:prstGeom>
+          <a:noFill/>
+        </p:spPr>
+        <p:txBody>
+          <a:bodyPr wrap="square">
+            <a:spAutoFit/>
+          </a:bodyPr>
+          <a:lstStyle/>
+          <a:p>
+            <a:pPr marL="0" marR="0">
+              <a:lnSpc>
+                <a:spcPct val="115000"/>
+              </a:lnSpc>
+              <a:spcBef>
+                <a:spcPts val="1200"/>
+              </a:spcBef>
+              <a:spcAft>
+                <a:spcPts val="1200"/>
+              </a:spcAft>
+            </a:pPr>
+            <a:r>
+              <a:rPr lang="en-US" sz="800" dirty="0">
+                <a:effectLst/>
+                <a:latin typeface="Arial" panose="020B0604020202020204" pitchFamily="34" charset="0"/>
+                <a:ea typeface="Arial" panose="020B0604020202020204" pitchFamily="34" charset="0"/>
+              </a:rPr>
+              <a:t>*</a:t>
+            </a:r>
+            <a:r>
+              <a:rPr lang="en-US" sz="800" dirty="0">
+                <a:latin typeface="Arial" panose="020B0604020202020204" pitchFamily="34" charset="0"/>
+                <a:ea typeface="Arial" panose="020B0604020202020204" pitchFamily="34" charset="0"/>
+              </a:rPr>
+              <a:t>Business Case 4: Determining number of run closure and predicted ticket markdown price</a:t>
+            </a:r>
+            <a:endParaRPr lang="en-US" sz="800" dirty="0">
+              <a:effectLst/>
+              <a:latin typeface="Arial" panose="020B0604020202020204" pitchFamily="34" charset="0"/>
+              <a:ea typeface="Arial" panose="020B0604020202020204" pitchFamily="34" charset="0"/>
+            </a:endParaRPr>
+          </a:p>
+        </p:txBody>
+      </p:sp>
+    </p:spTree>
+    <p:extLst>
+      <p:ext uri="{BB962C8B-B14F-4D97-AF65-F5344CB8AC3E}">
+        <p14:creationId xmlns:p14="http://schemas.microsoft.com/office/powerpoint/2010/main" val="3136295181"/>
+      </p:ext>
+    </p:extLst>
+  </p:cSld>
+  <p:clrMapOvr>
+    <a:masterClrMapping/>
+  </p:clrMapOvr>
+</p:sld>
+</file>
+
+<file path=ppt/slides/slide7.xml><?xml version="1.0" encoding="utf-8"?>
+<p:sld xmlns:a="http://schemas.openxmlformats.org/drawingml/2006/main" xmlns:r="http://schemas.openxmlformats.org/officeDocument/2006/relationships" xmlns:p="http://schemas.openxmlformats.org/presentationml/2006/main">
+  <p:cSld>
+    <p:spTree>
+      <p:nvGrpSpPr>
+        <p:cNvPr id="1" name=""/>
+        <p:cNvGrpSpPr/>
+        <p:nvPr/>
+      </p:nvGrpSpPr>
+      <p:grpSpPr>
+        <a:xfrm>
+          <a:off x="0" y="0"/>
+          <a:ext cx="0" cy="0"/>
+          <a:chOff x="0" y="0"/>
+          <a:chExt cx="0" cy="0"/>
+        </a:xfrm>
+      </p:grpSpPr>
+      <p:sp>
+        <p:nvSpPr>
           <p:cNvPr id="4" name="Slide Number Placeholder 3">
             <a:extLst>
               <a:ext uri="{FF2B5EF4-FFF2-40B4-BE49-F238E27FC236}">
@@ -5332,7 +6654,7 @@
                 <a:latin typeface="Arial" panose="020B0604020202020204" pitchFamily="34" charset="0"/>
                 <a:cs typeface="Arial" panose="020B0604020202020204" pitchFamily="34" charset="0"/>
               </a:rPr>
-              <a:t>5</a:t>
+              <a:t>7</a:t>
             </a:fld>
             <a:endParaRPr lang="en-US" dirty="0">
               <a:latin typeface="Arial" panose="020B0604020202020204" pitchFamily="34" charset="0"/>
@@ -5400,7 +6722,7 @@
         <p:spPr>
           <a:xfrm>
             <a:off x="599498" y="1695497"/>
-            <a:ext cx="8163955" cy="3416320"/>
+            <a:ext cx="8163955" cy="4462760"/>
           </a:xfrm>
           <a:prstGeom prst="rect">
             <a:avLst/>
@@ -5423,56 +6745,107 @@
               <a:buChar char="•"/>
             </a:pPr>
             <a:r>
-              <a:rPr lang="en-US" sz="2400" dirty="0">
+              <a:rPr lang="en-US" sz="2000" dirty="0">
+                <a:effectLst/>
                 <a:latin typeface="Arial" panose="020B0604020202020204" pitchFamily="34" charset="0"/>
-                <a:cs typeface="Arial" panose="020B0604020202020204" pitchFamily="34" charset="0"/>
+                <a:ea typeface="Arial" panose="020B0604020202020204" pitchFamily="34" charset="0"/>
               </a:rPr>
-              <a:t>Top 5 analysis shows that Harrow, </a:t>
-            </a:r>
-            <a:r>
-              <a:rPr lang="en-US" sz="2400" dirty="0" err="1">
+              <a:t>The analysis and design </a:t>
+            </a:r>
+            <a:r>
+              <a:rPr lang="en-US" sz="2000" dirty="0">
                 <a:latin typeface="Arial" panose="020B0604020202020204" pitchFamily="34" charset="0"/>
-                <a:cs typeface="Arial" panose="020B0604020202020204" pitchFamily="34" charset="0"/>
+                <a:ea typeface="Arial" panose="020B0604020202020204" pitchFamily="34" charset="0"/>
               </a:rPr>
-              <a:t>Croyden</a:t>
-            </a:r>
-            <a:r>
-              <a:rPr lang="en-US" sz="2400" dirty="0">
+              <a:t>of the </a:t>
+            </a:r>
+            <a:r>
+              <a:rPr lang="en-US" sz="2000" dirty="0">
+                <a:effectLst/>
                 <a:latin typeface="Arial" panose="020B0604020202020204" pitchFamily="34" charset="0"/>
-                <a:cs typeface="Arial" panose="020B0604020202020204" pitchFamily="34" charset="0"/>
+                <a:ea typeface="Arial" panose="020B0604020202020204" pitchFamily="34" charset="0"/>
               </a:rPr>
-              <a:t>, Hillingdon, Hounslow, and Redbridge were the highest in terms of average price ratio, therefore experienced the greatest price increase from 2003 and 2023.</a:t>
-            </a:r>
+              <a:t>random forest regressor model provided a key insight as per highlighting top features that seem to significantly affect </a:t>
+            </a:r>
+            <a:r>
+              <a:rPr lang="en-US" sz="2000" dirty="0" err="1">
+                <a:effectLst/>
+                <a:latin typeface="Arial" panose="020B0604020202020204" pitchFamily="34" charset="0"/>
+                <a:ea typeface="Arial" panose="020B0604020202020204" pitchFamily="34" charset="0"/>
+              </a:rPr>
+              <a:t>AdultWeekend</a:t>
+            </a:r>
+            <a:r>
+              <a:rPr lang="en-US" sz="2000" dirty="0">
+                <a:effectLst/>
+                <a:latin typeface="Arial" panose="020B0604020202020204" pitchFamily="34" charset="0"/>
+                <a:ea typeface="Arial" panose="020B0604020202020204" pitchFamily="34" charset="0"/>
+              </a:rPr>
+              <a:t> column ticket price namely </a:t>
+            </a:r>
+            <a:r>
+              <a:rPr lang="en-US" sz="2000" dirty="0" err="1">
+                <a:effectLst/>
+                <a:latin typeface="Arial" panose="020B0604020202020204" pitchFamily="34" charset="0"/>
+                <a:ea typeface="Arial" panose="020B0604020202020204" pitchFamily="34" charset="0"/>
+              </a:rPr>
+              <a:t>fastQuads</a:t>
+            </a:r>
+            <a:r>
+              <a:rPr lang="en-US" sz="2000" dirty="0">
+                <a:effectLst/>
+                <a:latin typeface="Arial" panose="020B0604020202020204" pitchFamily="34" charset="0"/>
+                <a:ea typeface="Arial" panose="020B0604020202020204" pitchFamily="34" charset="0"/>
+              </a:rPr>
+              <a:t>, Runs, area covered by snow making machines, and vertical drop.</a:t>
+            </a:r>
+          </a:p>
+          <a:p>
+            <a:endParaRPr lang="en-US" sz="2000" dirty="0">
+              <a:effectLst/>
+              <a:latin typeface="Arial" panose="020B0604020202020204" pitchFamily="34" charset="0"/>
+              <a:ea typeface="Arial" panose="020B0604020202020204" pitchFamily="34" charset="0"/>
+            </a:endParaRPr>
           </a:p>
           <a:p>
             <a:pPr marL="285750" indent="-285750">
               <a:buFont typeface="Arial" panose="020B0604020202020204" pitchFamily="34" charset="0"/>
               <a:buChar char="•"/>
             </a:pPr>
-            <a:endParaRPr lang="en-US" sz="2400" dirty="0">
+            <a:r>
+              <a:rPr lang="en-US" sz="2000" dirty="0">
+                <a:effectLst/>
+                <a:latin typeface="Arial" panose="020B0604020202020204" pitchFamily="34" charset="0"/>
+                <a:ea typeface="Arial" panose="020B0604020202020204" pitchFamily="34" charset="0"/>
+              </a:rPr>
+              <a:t>The pricing strategy of increasing ticket price by 12% for installing a new chair lift </a:t>
+            </a:r>
+            <a:r>
+              <a:rPr lang="en-US" sz="2000" dirty="0">
+                <a:latin typeface="Arial" panose="020B0604020202020204" pitchFamily="34" charset="0"/>
+                <a:ea typeface="Arial" panose="020B0604020202020204" pitchFamily="34" charset="0"/>
+              </a:rPr>
+              <a:t>as well as adding another run and increasing the vertical drop distance by 150 feet and increasing the area covered by snow making machines by 2 acres, will hopefully </a:t>
+            </a:r>
+            <a:r>
+              <a:rPr lang="en-US" sz="2000" dirty="0">
+                <a:effectLst/>
+                <a:latin typeface="Arial" panose="020B0604020202020204" pitchFamily="34" charset="0"/>
+                <a:ea typeface="Arial" panose="020B0604020202020204" pitchFamily="34" charset="0"/>
+              </a:rPr>
+              <a:t>recoup the costs of adding another ski lift for the resort and hopefully keep the profit margins within 9.2% for the next open season while still keeping Big Mountain Ski Resort in a competitive price point.</a:t>
+            </a:r>
+            <a:r>
+              <a:rPr lang="en-US" sz="2000" dirty="0">
+                <a:latin typeface="Arial" panose="020B0604020202020204" pitchFamily="34" charset="0"/>
+                <a:ea typeface="Arial" panose="020B0604020202020204" pitchFamily="34" charset="0"/>
+              </a:rPr>
+              <a:t>  </a:t>
+            </a:r>
+            <a:endParaRPr lang="en-US" sz="2000" dirty="0">
               <a:latin typeface="Arial" panose="020B0604020202020204" pitchFamily="34" charset="0"/>
               <a:cs typeface="Arial" panose="020B0604020202020204" pitchFamily="34" charset="0"/>
             </a:endParaRPr>
-          </a:p>
-          <a:p>
-            <a:pPr marL="285750" indent="-285750">
-              <a:buFont typeface="Arial" panose="020B0604020202020204" pitchFamily="34" charset="0"/>
-              <a:buChar char="•"/>
-            </a:pPr>
-            <a:r>
-              <a:rPr lang="en-US" sz="2400" dirty="0" err="1">
-                <a:latin typeface="Arial" panose="020B0604020202020204" pitchFamily="34" charset="0"/>
-                <a:cs typeface="Arial" panose="020B0604020202020204" pitchFamily="34" charset="0"/>
-              </a:rPr>
-              <a:t>Hackeny</a:t>
-            </a:r>
-            <a:r>
-              <a:rPr lang="en-US" sz="2400" dirty="0">
-                <a:latin typeface="Arial" panose="020B0604020202020204" pitchFamily="34" charset="0"/>
-                <a:cs typeface="Arial" panose="020B0604020202020204" pitchFamily="34" charset="0"/>
-              </a:rPr>
-              <a:t>, Waltham Forest, Kensington &amp; Chelsea, Haringey, and Southwark experienced the least change in price difference from 2003 and 2023.</a:t>
-            </a:r>
           </a:p>
         </p:txBody>
       </p:sp>
@@ -5525,7 +6898,7 @@
 </p:sld>
 </file>
 
-<file path=ppt/slides/slide6.xml><?xml version="1.0" encoding="utf-8"?>
+<file path=ppt/slides/slide8.xml><?xml version="1.0" encoding="utf-8"?>
 <p:sld xmlns:a="http://schemas.openxmlformats.org/drawingml/2006/main" xmlns:r="http://schemas.openxmlformats.org/officeDocument/2006/relationships" xmlns:p="http://schemas.openxmlformats.org/presentationml/2006/main">
   <p:cSld>
     <p:spTree>
@@ -5544,10 +6917,10 @@
       </p:grpSpPr>
       <p:pic>
         <p:nvPicPr>
-          <p:cNvPr id="6" name="Picture 5" descr="A bridge over a river with a clock tower&#10;&#10;Description automatically generated">
+          <p:cNvPr id="3" name="Picture 2" descr="A snowy mountain with buildings and trees&#10;&#10;Description automatically generated">
             <a:extLst>
               <a:ext uri="{FF2B5EF4-FFF2-40B4-BE49-F238E27FC236}">
-                <a16:creationId xmlns:a16="http://schemas.microsoft.com/office/drawing/2014/main" id="{DBCE0729-871E-13F4-77C5-65956ED09C60}"/>
+                <a16:creationId xmlns:a16="http://schemas.microsoft.com/office/drawing/2014/main" id="{852597F1-9DD6-E044-738D-8732F5D85BB8}"/>
               </a:ext>
             </a:extLst>
           </p:cNvPr>
@@ -5571,8 +6944,8 @@
         </p:blipFill>
         <p:spPr>
           <a:xfrm>
-            <a:off x="-590843" y="-57911"/>
-            <a:ext cx="10878962" cy="6915911"/>
+            <a:off x="-813816" y="-215526"/>
+            <a:ext cx="10616184" cy="7073526"/>
           </a:xfrm>
           <a:prstGeom prst="rect">
             <a:avLst/>
@@ -5605,7 +6978,7 @@
                 <a:latin typeface="Arial" panose="020B0604020202020204" pitchFamily="34" charset="0"/>
                 <a:cs typeface="Arial" panose="020B0604020202020204" pitchFamily="34" charset="0"/>
               </a:rPr>
-              <a:t>6</a:t>
+              <a:t>8</a:t>
             </a:fld>
             <a:endParaRPr lang="en-US" dirty="0">
               <a:latin typeface="Arial" panose="020B0604020202020204" pitchFamily="34" charset="0"/>
@@ -5752,8 +7125,8 @@
         </p:nvSpPr>
         <p:spPr>
           <a:xfrm>
-            <a:off x="1004172" y="1820910"/>
-            <a:ext cx="7235831" cy="261290"/>
+            <a:off x="2092890" y="1804365"/>
+            <a:ext cx="5177172" cy="261290"/>
           </a:xfrm>
           <a:prstGeom prst="rect">
             <a:avLst/>
@@ -5806,8 +7179,8 @@
         </p:nvSpPr>
         <p:spPr>
           <a:xfrm>
-            <a:off x="976584" y="1804365"/>
-            <a:ext cx="8167416" cy="261290"/>
+            <a:off x="2088818" y="1775407"/>
+            <a:ext cx="8167416" cy="442429"/>
           </a:xfrm>
           <a:prstGeom prst="rect">
             <a:avLst/>
@@ -5831,8 +7204,20 @@
                 <a:cs typeface="Times New Roman" panose="02020603050405020304" pitchFamily="18" charset="0"/>
                 <a:hlinkClick r:id="rId4"/>
               </a:rPr>
-              <a:t>https://github.com/tpoozhikala/Springboard/blob/main/UK_House_Prices_Challenge/Unit_4_Challenge_-_Tier_3.ipynb</a:t>
-            </a:r>
+              <a:t>https://github.com/tpoozhikala/DataScienceGuidedCapstone/tree/master/Notebooks</a:t>
+            </a:r>
+            <a:endParaRPr lang="en-US" sz="1100" b="1" dirty="0">
+              <a:latin typeface="Times New Roman" panose="02020603050405020304" pitchFamily="18" charset="0"/>
+              <a:ea typeface="Calibri" panose="020F0502020204030204" pitchFamily="34" charset="0"/>
+              <a:cs typeface="Times New Roman" panose="02020603050405020304" pitchFamily="18" charset="0"/>
+            </a:endParaRPr>
+          </a:p>
+          <a:p>
+            <a:pPr>
+              <a:lnSpc>
+                <a:spcPct val="107000"/>
+              </a:lnSpc>
+            </a:pPr>
             <a:endParaRPr lang="en-US" sz="1100" b="1" dirty="0">
               <a:latin typeface="Times New Roman" panose="02020603050405020304" pitchFamily="18" charset="0"/>
               <a:ea typeface="Calibri" panose="020F0502020204030204" pitchFamily="34" charset="0"/>

</xml_diff>